<commit_message>
modifid ppt to pdf
</commit_message>
<xml_diff>
--- a/other files/Abhishek Shankar - About Me.pptx
+++ b/other files/Abhishek Shankar - About Me.pptx
@@ -11769,22 +11769,15 @@
           <a:p>
             <a:pPr algn="ctr"/>
             <a:r>
-              <a:rPr lang="en-US">
+              <a:rPr lang="en-US" dirty="0">
                 <a:solidFill>
                   <a:schemeClr val="bg1"/>
                 </a:solidFill>
                 <a:latin typeface="Times New Roman" panose="02020603050405020304" pitchFamily="18" charset="0"/>
                 <a:cs typeface="Times New Roman" panose="02020603050405020304" pitchFamily="18" charset="0"/>
               </a:rPr>
-              <a:t>03-December-24</a:t>
-            </a:r>
-            <a:endParaRPr lang="en-US" dirty="0">
-              <a:solidFill>
-                <a:schemeClr val="bg1"/>
-              </a:solidFill>
-              <a:latin typeface="Times New Roman" panose="02020603050405020304" pitchFamily="18" charset="0"/>
-              <a:cs typeface="Times New Roman" panose="02020603050405020304" pitchFamily="18" charset="0"/>
-            </a:endParaRPr>
+              <a:t>December-24</a:t>
+            </a:r>
           </a:p>
         </p:txBody>
       </p:sp>

</xml_diff>